<commit_message>
update 9 and 10
</commit_message>
<xml_diff>
--- a/HC09/HC9_EN.pptx
+++ b/HC09/HC9_EN.pptx
@@ -159,6 +159,118 @@
 </p:cmAuthorLst>
 </file>
 
+<file path=ppt/revisionInfo.xml><?xml version="1.0" encoding="utf-8"?>
+<p1510:revInfo xmlns:a="http://schemas.openxmlformats.org/drawingml/2006/main" xmlns:r="http://schemas.openxmlformats.org/officeDocument/2006/relationships" xmlns:p1510="http://schemas.microsoft.com/office/powerpoint/2015/10/main">
+  <p1510:revLst>
+    <p1510:client id="{9D2107FC-0D82-4BC3-9513-E350E1B474A0}" v="79" dt="2025-04-27T09:17:11.681"/>
+  </p1510:revLst>
+</p1510:revInfo>
+</file>
+
+<file path=ppt/changesInfos/changesInfo1.xml><?xml version="1.0" encoding="utf-8"?>
+<pc:chgInfo xmlns:a="http://schemas.openxmlformats.org/drawingml/2006/main" xmlns:r="http://schemas.openxmlformats.org/officeDocument/2006/relationships" xmlns:ac="http://schemas.microsoft.com/office/drawing/2013/main/command" xmlns:pc="http://schemas.microsoft.com/office/powerpoint/2013/main/command">
+  <pc:docChgLst>
+    <pc:chgData name="Caspar van Lissa" userId="66f0d9d8-5e0d-4c8f-a33e-eb362e4340e3" providerId="ADAL" clId="{9D2107FC-0D82-4BC3-9513-E350E1B474A0}"/>
+    <pc:docChg chg="custSel modSld">
+      <pc:chgData name="Caspar van Lissa" userId="66f0d9d8-5e0d-4c8f-a33e-eb362e4340e3" providerId="ADAL" clId="{9D2107FC-0D82-4BC3-9513-E350E1B474A0}" dt="2025-04-27T09:17:11.681" v="939" actId="20577"/>
+      <pc:docMkLst>
+        <pc:docMk/>
+      </pc:docMkLst>
+      <pc:sldChg chg="modSp mod">
+        <pc:chgData name="Caspar van Lissa" userId="66f0d9d8-5e0d-4c8f-a33e-eb362e4340e3" providerId="ADAL" clId="{9D2107FC-0D82-4BC3-9513-E350E1B474A0}" dt="2025-04-27T09:09:08.641" v="136" actId="20577"/>
+        <pc:sldMkLst>
+          <pc:docMk/>
+          <pc:sldMk cId="612400043" sldId="516"/>
+        </pc:sldMkLst>
+        <pc:spChg chg="mod">
+          <ac:chgData name="Caspar van Lissa" userId="66f0d9d8-5e0d-4c8f-a33e-eb362e4340e3" providerId="ADAL" clId="{9D2107FC-0D82-4BC3-9513-E350E1B474A0}" dt="2025-04-27T09:09:08.641" v="136" actId="20577"/>
+          <ac:spMkLst>
+            <pc:docMk/>
+            <pc:sldMk cId="612400043" sldId="516"/>
+            <ac:spMk id="3" creationId="{00000000-0000-0000-0000-000000000000}"/>
+          </ac:spMkLst>
+        </pc:spChg>
+      </pc:sldChg>
+      <pc:sldChg chg="modSp mod">
+        <pc:chgData name="Caspar van Lissa" userId="66f0d9d8-5e0d-4c8f-a33e-eb362e4340e3" providerId="ADAL" clId="{9D2107FC-0D82-4BC3-9513-E350E1B474A0}" dt="2025-04-27T08:53:03.285" v="101" actId="114"/>
+        <pc:sldMkLst>
+          <pc:docMk/>
+          <pc:sldMk cId="2990294607" sldId="527"/>
+        </pc:sldMkLst>
+        <pc:spChg chg="mod">
+          <ac:chgData name="Caspar van Lissa" userId="66f0d9d8-5e0d-4c8f-a33e-eb362e4340e3" providerId="ADAL" clId="{9D2107FC-0D82-4BC3-9513-E350E1B474A0}" dt="2025-04-27T08:53:03.285" v="101" actId="114"/>
+          <ac:spMkLst>
+            <pc:docMk/>
+            <pc:sldMk cId="2990294607" sldId="527"/>
+            <ac:spMk id="3" creationId="{00000000-0000-0000-0000-000000000000}"/>
+          </ac:spMkLst>
+        </pc:spChg>
+      </pc:sldChg>
+      <pc:sldChg chg="modSp mod">
+        <pc:chgData name="Caspar van Lissa" userId="66f0d9d8-5e0d-4c8f-a33e-eb362e4340e3" providerId="ADAL" clId="{9D2107FC-0D82-4BC3-9513-E350E1B474A0}" dt="2025-04-27T09:11:38.904" v="385" actId="20577"/>
+        <pc:sldMkLst>
+          <pc:docMk/>
+          <pc:sldMk cId="2564022110" sldId="532"/>
+        </pc:sldMkLst>
+        <pc:spChg chg="mod">
+          <ac:chgData name="Caspar van Lissa" userId="66f0d9d8-5e0d-4c8f-a33e-eb362e4340e3" providerId="ADAL" clId="{9D2107FC-0D82-4BC3-9513-E350E1B474A0}" dt="2025-04-27T09:11:38.904" v="385" actId="20577"/>
+          <ac:spMkLst>
+            <pc:docMk/>
+            <pc:sldMk cId="2564022110" sldId="532"/>
+            <ac:spMk id="3" creationId="{00000000-0000-0000-0000-000000000000}"/>
+          </ac:spMkLst>
+        </pc:spChg>
+      </pc:sldChg>
+      <pc:sldChg chg="modSp mod">
+        <pc:chgData name="Caspar van Lissa" userId="66f0d9d8-5e0d-4c8f-a33e-eb362e4340e3" providerId="ADAL" clId="{9D2107FC-0D82-4BC3-9513-E350E1B474A0}" dt="2025-04-27T09:12:59.182" v="605" actId="20577"/>
+        <pc:sldMkLst>
+          <pc:docMk/>
+          <pc:sldMk cId="3638830826" sldId="533"/>
+        </pc:sldMkLst>
+        <pc:spChg chg="mod">
+          <ac:chgData name="Caspar van Lissa" userId="66f0d9d8-5e0d-4c8f-a33e-eb362e4340e3" providerId="ADAL" clId="{9D2107FC-0D82-4BC3-9513-E350E1B474A0}" dt="2025-04-27T09:12:59.182" v="605" actId="20577"/>
+          <ac:spMkLst>
+            <pc:docMk/>
+            <pc:sldMk cId="3638830826" sldId="533"/>
+            <ac:spMk id="3" creationId="{00000000-0000-0000-0000-000000000000}"/>
+          </ac:spMkLst>
+        </pc:spChg>
+      </pc:sldChg>
+      <pc:sldChg chg="modSp mod">
+        <pc:chgData name="Caspar van Lissa" userId="66f0d9d8-5e0d-4c8f-a33e-eb362e4340e3" providerId="ADAL" clId="{9D2107FC-0D82-4BC3-9513-E350E1B474A0}" dt="2025-04-27T09:14:32.837" v="721" actId="20577"/>
+        <pc:sldMkLst>
+          <pc:docMk/>
+          <pc:sldMk cId="358548080" sldId="543"/>
+        </pc:sldMkLst>
+        <pc:spChg chg="mod">
+          <ac:chgData name="Caspar van Lissa" userId="66f0d9d8-5e0d-4c8f-a33e-eb362e4340e3" providerId="ADAL" clId="{9D2107FC-0D82-4BC3-9513-E350E1B474A0}" dt="2025-04-27T09:14:32.837" v="721" actId="20577"/>
+          <ac:spMkLst>
+            <pc:docMk/>
+            <pc:sldMk cId="358548080" sldId="543"/>
+            <ac:spMk id="3" creationId="{00000000-0000-0000-0000-000000000000}"/>
+          </ac:spMkLst>
+        </pc:spChg>
+      </pc:sldChg>
+      <pc:sldChg chg="modSp mod">
+        <pc:chgData name="Caspar van Lissa" userId="66f0d9d8-5e0d-4c8f-a33e-eb362e4340e3" providerId="ADAL" clId="{9D2107FC-0D82-4BC3-9513-E350E1B474A0}" dt="2025-04-27T09:17:11.681" v="939" actId="20577"/>
+        <pc:sldMkLst>
+          <pc:docMk/>
+          <pc:sldMk cId="3566967735" sldId="545"/>
+        </pc:sldMkLst>
+        <pc:spChg chg="mod">
+          <ac:chgData name="Caspar van Lissa" userId="66f0d9d8-5e0d-4c8f-a33e-eb362e4340e3" providerId="ADAL" clId="{9D2107FC-0D82-4BC3-9513-E350E1B474A0}" dt="2025-04-27T09:17:11.681" v="939" actId="20577"/>
+          <ac:spMkLst>
+            <pc:docMk/>
+            <pc:sldMk cId="3566967735" sldId="545"/>
+            <ac:spMk id="3" creationId="{00000000-0000-0000-0000-000000000000}"/>
+          </ac:spMkLst>
+        </pc:spChg>
+      </pc:sldChg>
+    </pc:docChg>
+  </pc:docChgLst>
+</pc:chgInfo>
+</file>
+
 <file path=ppt/comments/comment1.xml><?xml version="1.0" encoding="utf-8"?>
 <p:cmLst xmlns:a="http://schemas.openxmlformats.org/drawingml/2006/main" xmlns:r="http://schemas.openxmlformats.org/officeDocument/2006/relationships" xmlns:p="http://schemas.openxmlformats.org/presentationml/2006/main">
   <p:cm authorId="1" dt="2021-01-20T15:36:35.184" idx="34">
@@ -270,7 +382,7 @@
           <a:p>
             <a:fld id="{E7C94BC4-5B77-4BEA-AE10-D37FB4958CB3}" type="datetimeFigureOut">
               <a:rPr lang="en-US" smtClean="0"/>
-              <a:t>2/24/2023</a:t>
+              <a:t>4/27/2025</a:t>
             </a:fld>
             <a:endParaRPr lang="en-US" dirty="0"/>
           </a:p>
@@ -435,7 +547,7 @@
           <a:p>
             <a:fld id="{3D057A1C-535D-42DB-8B7E-CBD05FB93862}" type="datetimeFigureOut">
               <a:rPr lang="en-US" smtClean="0"/>
-              <a:t>2/24/2023</a:t>
+              <a:t>4/27/2025</a:t>
             </a:fld>
             <a:endParaRPr lang="en-US" dirty="0"/>
           </a:p>
@@ -3073,7 +3185,7 @@
           <a:p>
             <a:fld id="{BB8783B2-72BD-4BEE-82FF-97F7EADCF7B4}" type="datetime1">
               <a:rPr lang="en-US" smtClean="0"/>
-              <a:t>2/24/2023</a:t>
+              <a:t>4/27/2025</a:t>
             </a:fld>
             <a:endParaRPr lang="en-US" dirty="0"/>
           </a:p>
@@ -3246,7 +3358,7 @@
           <a:p>
             <a:fld id="{A931640A-9191-4499-A3E6-7268C3535893}" type="datetime1">
               <a:rPr lang="en-US" smtClean="0"/>
-              <a:t>2/24/2023</a:t>
+              <a:t>4/27/2025</a:t>
             </a:fld>
             <a:endParaRPr lang="en-US" dirty="0"/>
           </a:p>
@@ -3429,7 +3541,7 @@
           <a:p>
             <a:fld id="{44FD5E48-9C84-482F-BD84-16541D367641}" type="datetime1">
               <a:rPr lang="en-US" smtClean="0"/>
-              <a:t>2/24/2023</a:t>
+              <a:t>4/27/2025</a:t>
             </a:fld>
             <a:endParaRPr lang="en-US" dirty="0"/>
           </a:p>
@@ -3602,7 +3714,7 @@
           <a:p>
             <a:fld id="{8DB3A0DD-897B-4DDE-A8FA-46E022791A61}" type="datetime1">
               <a:rPr lang="en-US" smtClean="0"/>
-              <a:t>2/24/2023</a:t>
+              <a:t>4/27/2025</a:t>
             </a:fld>
             <a:endParaRPr lang="en-US" dirty="0"/>
           </a:p>
@@ -3851,7 +3963,7 @@
           <a:p>
             <a:fld id="{E831A6F8-1754-4C8D-B3BE-68338B9F2BC8}" type="datetime1">
               <a:rPr lang="en-US" smtClean="0"/>
-              <a:t>2/24/2023</a:t>
+              <a:t>4/27/2025</a:t>
             </a:fld>
             <a:endParaRPr lang="en-US" dirty="0"/>
           </a:p>
@@ -4086,7 +4198,7 @@
           <a:p>
             <a:fld id="{151961CC-945A-47B0-8AF0-2F7EFF2BA442}" type="datetime1">
               <a:rPr lang="en-US" smtClean="0"/>
-              <a:t>2/24/2023</a:t>
+              <a:t>4/27/2025</a:t>
             </a:fld>
             <a:endParaRPr lang="en-US" dirty="0"/>
           </a:p>
@@ -4456,7 +4568,7 @@
           <a:p>
             <a:fld id="{A5A370A5-5328-49CD-B55E-5C3F9DD853A3}" type="datetime1">
               <a:rPr lang="en-US" smtClean="0"/>
-              <a:t>2/24/2023</a:t>
+              <a:t>4/27/2025</a:t>
             </a:fld>
             <a:endParaRPr lang="en-US" dirty="0"/>
           </a:p>
@@ -4577,7 +4689,7 @@
           <a:p>
             <a:fld id="{8C305637-EB38-422D-AF21-63894D9492C4}" type="datetime1">
               <a:rPr lang="en-US" smtClean="0"/>
-              <a:t>2/24/2023</a:t>
+              <a:t>4/27/2025</a:t>
             </a:fld>
             <a:endParaRPr lang="en-US" dirty="0"/>
           </a:p>
@@ -4675,7 +4787,7 @@
           <a:p>
             <a:fld id="{909FF559-10AC-4D72-A2E7-B572D276E4F4}" type="datetime1">
               <a:rPr lang="en-US" smtClean="0"/>
-              <a:t>2/24/2023</a:t>
+              <a:t>4/27/2025</a:t>
             </a:fld>
             <a:endParaRPr lang="en-US" dirty="0"/>
           </a:p>
@@ -4955,7 +5067,7 @@
           <a:p>
             <a:fld id="{0EFC9512-15F8-44B0-B048-5FF0D554CF44}" type="datetime1">
               <a:rPr lang="en-US" smtClean="0"/>
-              <a:t>2/24/2023</a:t>
+              <a:t>4/27/2025</a:t>
             </a:fld>
             <a:endParaRPr lang="en-US" dirty="0"/>
           </a:p>
@@ -5214,7 +5326,7 @@
           <a:p>
             <a:fld id="{958CB0E4-111B-4C80-921E-EADCF114ED4F}" type="datetime1">
               <a:rPr lang="en-US" smtClean="0"/>
-              <a:t>2/24/2023</a:t>
+              <a:t>4/27/2025</a:t>
             </a:fld>
             <a:endParaRPr lang="en-US" dirty="0"/>
           </a:p>
@@ -5430,7 +5542,7 @@
           <a:p>
             <a:fld id="{E13DA098-02A7-4C0A-A288-02AFA4E5C464}" type="datetime1">
               <a:rPr lang="en-US" smtClean="0"/>
-              <a:t>2/24/2023</a:t>
+              <a:t>4/27/2025</a:t>
             </a:fld>
             <a:endParaRPr lang="en-US" dirty="0"/>
           </a:p>
@@ -10577,7 +10689,7 @@
         </p:spPr>
         <p:txBody>
           <a:bodyPr>
-            <a:normAutofit/>
+            <a:normAutofit fontScale="92500" lnSpcReduction="20000"/>
           </a:bodyPr>
           <a:lstStyle/>
           <a:p>
@@ -10648,7 +10760,18 @@
             </a:pPr>
             <a:r>
               <a:rPr lang="en-US" sz="1900" noProof="0" dirty="0"/>
-              <a:t>Covariate is measured before the experimental manipulation</a:t>
+              <a:t>Covariate is measured before the experimental manipulation </a:t>
+            </a:r>
+            <a:br>
+              <a:rPr lang="en-US" sz="1900" noProof="0" dirty="0"/>
+            </a:br>
+            <a:r>
+              <a:rPr lang="en-US" sz="1900" i="1" noProof="0" dirty="0">
+                <a:solidFill>
+                  <a:srgbClr val="FF0000"/>
+                </a:solidFill>
+              </a:rPr>
+              <a:t>(= assumption that model is correctly specified)</a:t>
             </a:r>
           </a:p>
           <a:p>
@@ -10660,6 +10783,18 @@
               <a:rPr lang="en-US" sz="1900" noProof="0" dirty="0"/>
               <a:t>Covariate is measured without measurement error</a:t>
             </a:r>
+            <a:br>
+              <a:rPr lang="en-US" sz="1900" noProof="0" dirty="0"/>
+            </a:br>
+            <a:r>
+              <a:rPr lang="en-US" sz="1900" i="1" noProof="0" dirty="0">
+                <a:solidFill>
+                  <a:srgbClr val="FF0000"/>
+                </a:solidFill>
+              </a:rPr>
+              <a:t>(= always the case in general linear model, also in regression, t-test et cetera)</a:t>
+            </a:r>
+            <a:endParaRPr lang="en-US" sz="1900" noProof="0" dirty="0"/>
           </a:p>
           <a:p>
             <a:pPr marL="457200" indent="-457200">
@@ -10670,6 +10805,18 @@
               <a:rPr lang="en-US" sz="1900" noProof="0" dirty="0"/>
               <a:t>Relation between X and Y is linear</a:t>
             </a:r>
+            <a:br>
+              <a:rPr lang="en-US" sz="1900" noProof="0" dirty="0"/>
+            </a:br>
+            <a:r>
+              <a:rPr lang="en-US" sz="1900" i="1" noProof="0" dirty="0">
+                <a:solidFill>
+                  <a:srgbClr val="FF0000"/>
+                </a:solidFill>
+              </a:rPr>
+              <a:t>(= always the case in general linear model)</a:t>
+            </a:r>
+            <a:endParaRPr lang="en-US" sz="1900" noProof="0" dirty="0"/>
           </a:p>
           <a:p>
             <a:pPr marL="457200" indent="-457200">
@@ -10686,6 +10833,20 @@
               </a:rPr>
               <a:t> no interaction between X and Group</a:t>
             </a:r>
+            <a:br>
+              <a:rPr lang="en-US" sz="1900" noProof="0" dirty="0">
+                <a:sym typeface="Wingdings" panose="05000000000000000000" pitchFamily="2" charset="2"/>
+              </a:rPr>
+            </a:br>
+            <a:r>
+              <a:rPr lang="en-US" sz="1900" i="1" noProof="0" dirty="0">
+                <a:solidFill>
+                  <a:srgbClr val="FF0000"/>
+                </a:solidFill>
+              </a:rPr>
+              <a:t>(= always the case in general linear model)</a:t>
+            </a:r>
+            <a:endParaRPr lang="en-US" sz="1900" noProof="0" dirty="0"/>
           </a:p>
           <a:p>
             <a:pPr marL="457200" indent="-457200">
@@ -10846,7 +11007,7 @@
         </p:spPr>
         <p:txBody>
           <a:bodyPr>
-            <a:normAutofit/>
+            <a:normAutofit lnSpcReduction="10000"/>
           </a:bodyPr>
           <a:lstStyle/>
           <a:p>
@@ -10863,7 +11024,7 @@
             <a:pPr lvl="1"/>
             <a:r>
               <a:rPr lang="en-US" sz="1900" noProof="0" dirty="0"/>
-              <a:t>Covariate should not be affected by the manipulation</a:t>
+              <a:t>Covariate should not be affected by the manipulation </a:t>
             </a:r>
           </a:p>
           <a:p>
@@ -10964,7 +11125,25 @@
               </a:rPr>
               <a:t>An extra assumption in case you include more than one covariate  no high correlations among covariates</a:t>
             </a:r>
-            <a:endParaRPr lang="en-US" sz="1900" noProof="0" dirty="0"/>
+            <a:br>
+              <a:rPr lang="en-US" sz="1900" noProof="0" dirty="0">
+                <a:sym typeface="Wingdings" panose="05000000000000000000" pitchFamily="2" charset="2"/>
+              </a:rPr>
+            </a:br>
+            <a:r>
+              <a:rPr lang="en-US" sz="1900" i="1" noProof="0" dirty="0">
+                <a:solidFill>
+                  <a:srgbClr val="FF0000"/>
+                </a:solidFill>
+                <a:sym typeface="Wingdings" panose="05000000000000000000" pitchFamily="2" charset="2"/>
+              </a:rPr>
+              <a:t>(=multicollinearity. Note that assumption 4 also introduces multicollinearity between factor and covariate)</a:t>
+            </a:r>
+            <a:endParaRPr lang="en-US" sz="1900" i="1" noProof="0" dirty="0">
+              <a:solidFill>
+                <a:srgbClr val="FF0000"/>
+              </a:solidFill>
+            </a:endParaRPr>
           </a:p>
         </p:txBody>
       </p:sp>
@@ -13475,7 +13654,14 @@
             <a:pPr lvl="0"/>
             <a:r>
               <a:rPr lang="en-US" sz="1900" noProof="0" dirty="0"/>
-              <a:t>One of the assumptions of the techniques that were already discussed (ANOVA, ANCOVA) is that all observations are independent (errors uncorrelated)</a:t>
+              <a:t>One of the assumptions of the techniques that were already discussed (ANOVA, ANCOVA) is that </a:t>
+            </a:r>
+            <a:br>
+              <a:rPr lang="en-US" sz="1900" noProof="0" dirty="0"/>
+            </a:br>
+            <a:r>
+              <a:rPr lang="en-US" sz="1900" u="sng" noProof="0" dirty="0"/>
+              <a:t>all observations are independent (errors uncorrelated)</a:t>
             </a:r>
           </a:p>
           <a:p>
@@ -13492,33 +13678,26 @@
               <a:t>dependent</a:t>
             </a:r>
             <a:r>
+              <a:rPr lang="en-US" sz="1900" i="1" dirty="0"/>
+              <a:t>: a person’s repeated responses are more similar than those of randomly selected individuals.</a:t>
+            </a:r>
+            <a:endParaRPr lang="en-US" sz="1900" noProof="0" dirty="0"/>
+          </a:p>
+          <a:p>
+            <a:endParaRPr lang="en-US" sz="1900" noProof="0" dirty="0"/>
+          </a:p>
+          <a:p>
+            <a:r>
               <a:rPr lang="en-US" sz="1900" noProof="0" dirty="0"/>
-              <a:t>!</a:t>
-            </a:r>
-          </a:p>
-          <a:p>
-            <a:endParaRPr lang="en-US" sz="1900" noProof="0" dirty="0"/>
-          </a:p>
-          <a:p>
+              <a:t>AN(C)OVA is not robust against violation of the assumption of independence of observations: true       </a:t>
+            </a:r>
+            <a:r>
+              <a:rPr lang="en-US" sz="1900" i="1" noProof="0" dirty="0"/>
+              <a:t>p</a:t>
+            </a:r>
             <a:r>
               <a:rPr lang="en-US" sz="1900" noProof="0" dirty="0"/>
-              <a:t>AN(C)OVA is not robust against violation of the assumption of independence of observations: </a:t>
-            </a:r>
-            <a:r>
-              <a:rPr lang="en-US" sz="1900" noProof="0"/>
-              <a:t>true       </a:t>
-            </a:r>
-            <a:r>
-              <a:rPr lang="en-US" sz="1900" i="1" noProof="0"/>
-              <a:t>p</a:t>
-            </a:r>
-            <a:r>
-              <a:rPr lang="en-US" sz="1900" noProof="0"/>
-              <a:t>-value </a:t>
-            </a:r>
-            <a:r>
-              <a:rPr lang="en-US" sz="1900" noProof="0" dirty="0"/>
-              <a:t>strongly deviates from the computed </a:t>
+              <a:t>-value strongly deviates from the computed </a:t>
             </a:r>
             <a:r>
               <a:rPr lang="en-US" sz="1900" i="1" noProof="0" dirty="0"/>
@@ -15831,7 +16010,7 @@
         <p:spPr/>
         <p:txBody>
           <a:bodyPr>
-            <a:normAutofit/>
+            <a:normAutofit lnSpcReduction="10000"/>
           </a:bodyPr>
           <a:lstStyle/>
           <a:p>
@@ -15852,6 +16031,17 @@
             <a:endParaRPr lang="en-US" sz="1900" b="1" noProof="0" dirty="0"/>
           </a:p>
           <a:p>
+            <a:pPr lvl="0"/>
+            <a:r>
+              <a:rPr lang="en-US" sz="1900" noProof="0" dirty="0"/>
+              <a:t>N = 10, measured 2x</a:t>
+            </a:r>
+          </a:p>
+          <a:p>
+            <a:pPr lvl="0"/>
+            <a:endParaRPr lang="en-US" sz="1900" b="1" noProof="0" dirty="0"/>
+          </a:p>
+          <a:p>
             <a:r>
               <a:rPr lang="en-US" sz="1900" noProof="0" dirty="0"/>
               <a:t>Our first thought may be to do an independent samples </a:t>
@@ -15868,7 +16058,7 @@
               <a:rPr lang="en-US" sz="1900" noProof="0" dirty="0">
                 <a:sym typeface="Wingdings" panose="05000000000000000000" pitchFamily="2" charset="2"/>
               </a:rPr>
-              <a:t> dependency! </a:t>
+              <a:t> dependency! You’d be using each participant twice, t(18).</a:t>
             </a:r>
           </a:p>
           <a:p>
@@ -15896,7 +16086,7 @@
             </a:r>
             <a:r>
               <a:rPr lang="en-US" sz="1900" noProof="0" dirty="0"/>
-              <a:t>-test</a:t>
+              <a:t>-test. You’re using each participant once, so t(9)</a:t>
             </a:r>
           </a:p>
           <a:p>
@@ -15906,24 +16096,32 @@
             <a:pPr lvl="0"/>
             <a:r>
               <a:rPr lang="en-US" sz="1900" noProof="0" dirty="0"/>
-              <a:t>Note that a paired-samples </a:t>
-            </a:r>
-            <a:r>
-              <a:rPr lang="en-US" sz="1900" i="1" noProof="0" dirty="0"/>
+              <a:t>Note that </a:t>
+            </a:r>
+            <a:r>
+              <a:rPr lang="en-US" sz="1900" u="sng" noProof="0" dirty="0"/>
+              <a:t>a paired-samples </a:t>
+            </a:r>
+            <a:r>
+              <a:rPr lang="en-US" sz="1900" i="1" u="sng" noProof="0" dirty="0"/>
               <a:t>t</a:t>
             </a:r>
             <a:r>
-              <a:rPr lang="en-US" sz="1900" noProof="0" dirty="0"/>
+              <a:rPr lang="en-US" sz="1900" u="sng" noProof="0" dirty="0"/>
               <a:t>-test is the same as a one-sample </a:t>
             </a:r>
             <a:r>
-              <a:rPr lang="en-US" sz="1900" i="1" noProof="0" dirty="0"/>
+              <a:rPr lang="en-US" sz="1900" i="1" u="sng" noProof="0" dirty="0"/>
               <a:t>t-</a:t>
             </a:r>
             <a:r>
-              <a:rPr lang="en-US" sz="1900" noProof="0" dirty="0"/>
+              <a:rPr lang="en-US" sz="1900" u="sng" noProof="0" dirty="0"/>
               <a:t>test on the difference scores</a:t>
             </a:r>
+            <a:br>
+              <a:rPr lang="en-US" sz="1900" u="sng" noProof="0" dirty="0"/>
+            </a:br>
+            <a:endParaRPr lang="en-US" sz="1900" noProof="0" dirty="0"/>
           </a:p>
           <a:p>
             <a:endParaRPr lang="en-US" sz="1900" noProof="0" dirty="0"/>
@@ -17167,6 +17365,19 @@
             </a:r>
           </a:p>
           <a:p>
+            <a:endParaRPr lang="en-US" sz="1900" dirty="0"/>
+          </a:p>
+          <a:p>
+            <a:r>
+              <a:rPr lang="en-US" sz="1900" i="1" noProof="0" dirty="0">
+                <a:solidFill>
+                  <a:srgbClr val="FF0000"/>
+                </a:solidFill>
+              </a:rPr>
+              <a:t>Assuming the factor and X are independent causes of Y</a:t>
+            </a:r>
+          </a:p>
+          <a:p>
             <a:endParaRPr lang="en-US" sz="1900" noProof="0" dirty="0"/>
           </a:p>
         </p:txBody>
@@ -21303,7 +21514,7 @@
           <a:p>
             <a:r>
               <a:rPr lang="en-US" sz="1900" noProof="0" dirty="0"/>
-              <a:t>What if we were able to “filter out” these age-related differences; would we then find an effect of energy drink? In other words: </a:t>
+              <a:t>What if we were able to control for/remove the influence of these age-related differences; would we then find an effect of energy drink? In other words: </a:t>
             </a:r>
             <a:r>
               <a:rPr lang="en-US" sz="1900" i="1" noProof="0" dirty="0"/>

</xml_diff>